<commit_message>
updated merged w graphs
</commit_message>
<xml_diff>
--- a/Criminal_Weather.pptx
+++ b/Criminal_Weather.pptx
@@ -114,6 +114,11 @@
       </a:defRPr>
     </a:lvl9pPr>
   </p:defaultTextStyle>
+  <p:extLst>
+    <p:ext uri="{EFAFB233-063F-42B5-8137-9DF3F51BA10A}">
+      <p15:sldGuideLst xmlns:p15="http://schemas.microsoft.com/office/powerpoint/2012/main"/>
+    </p:ext>
+  </p:extLst>
 </p:presentation>
 </file>
 
@@ -199,7 +204,7 @@
           <a:p>
             <a:fld id="{2FDC915E-37A9-4362-BD68-07612876E1D6}" type="datetimeFigureOut">
               <a:rPr lang="en-US" smtClean="0"/>
-              <a:t>12/12/2020</a:t>
+              <a:t>12/13/2020</a:t>
             </a:fld>
             <a:endParaRPr lang="en-US"/>
           </a:p>
@@ -613,7 +618,7 @@
           <a:p>
             <a:fld id="{97E2D343-76FB-47D3-B1E3-233CDD45ED3B}" type="datetime1">
               <a:rPr lang="en-US" smtClean="0"/>
-              <a:t>12/12/2020</a:t>
+              <a:t>12/13/2020</a:t>
             </a:fld>
             <a:endParaRPr lang="en-US"/>
           </a:p>
@@ -814,7 +819,7 @@
           <a:p>
             <a:fld id="{D3698A09-B012-494C-A03C-C8A9883FC331}" type="datetime1">
               <a:rPr lang="en-US" smtClean="0"/>
-              <a:t>12/12/2020</a:t>
+              <a:t>12/13/2020</a:t>
             </a:fld>
             <a:endParaRPr lang="en-US"/>
           </a:p>
@@ -1025,7 +1030,7 @@
           <a:p>
             <a:fld id="{FCC5AB44-B055-43CB-A428-5E42FAB59D34}" type="datetime1">
               <a:rPr lang="en-US" smtClean="0"/>
-              <a:t>12/12/2020</a:t>
+              <a:t>12/13/2020</a:t>
             </a:fld>
             <a:endParaRPr lang="en-US"/>
           </a:p>
@@ -1238,7 +1243,7 @@
             <a:fld id="{05352AD3-D06F-4A86-8A3E-FE524A3CD3FF}" type="datetime1">
               <a:rPr lang="en-US" smtClean="0"/>
               <a:pPr/>
-              <a:t>12/12/2020</a:t>
+              <a:t>12/13/2020</a:t>
             </a:fld>
             <a:endParaRPr lang="en-US"/>
           </a:p>
@@ -1539,7 +1544,7 @@
           <a:p>
             <a:fld id="{BE2DDBC9-F61A-4808-92DE-8548BA7E511D}" type="datetime1">
               <a:rPr lang="en-US" smtClean="0"/>
-              <a:t>12/12/2020</a:t>
+              <a:t>12/13/2020</a:t>
             </a:fld>
             <a:endParaRPr lang="en-US"/>
           </a:p>
@@ -1807,7 +1812,7 @@
           <a:p>
             <a:fld id="{82342217-08B5-4228-83BD-A002E33938EE}" type="datetime1">
               <a:rPr lang="en-US" smtClean="0"/>
-              <a:t>12/12/2020</a:t>
+              <a:t>12/13/2020</a:t>
             </a:fld>
             <a:endParaRPr lang="en-US"/>
           </a:p>
@@ -2222,7 +2227,7 @@
           <a:p>
             <a:fld id="{86E6BC79-E009-4F32-9F4F-60DEAC9AA7C1}" type="datetime1">
               <a:rPr lang="en-US" smtClean="0"/>
-              <a:t>12/12/2020</a:t>
+              <a:t>12/13/2020</a:t>
             </a:fld>
             <a:endParaRPr lang="en-US"/>
           </a:p>
@@ -2366,7 +2371,7 @@
           <a:p>
             <a:fld id="{3C9AEE8F-A73E-4BCD-890A-986766D356E8}" type="datetime1">
               <a:rPr lang="en-US" smtClean="0"/>
-              <a:t>12/12/2020</a:t>
+              <a:t>12/13/2020</a:t>
             </a:fld>
             <a:endParaRPr lang="en-US"/>
           </a:p>
@@ -2482,7 +2487,7 @@
           <a:p>
             <a:fld id="{4C3AE281-4AE8-4F0A-A025-80E3FCE613CF}" type="datetime1">
               <a:rPr lang="en-US" smtClean="0"/>
-              <a:t>12/12/2020</a:t>
+              <a:t>12/13/2020</a:t>
             </a:fld>
             <a:endParaRPr lang="en-US"/>
           </a:p>
@@ -2796,7 +2801,7 @@
           <a:p>
             <a:fld id="{F1296FD6-EE57-4FCB-BD5A-FA71979F72C2}" type="datetime1">
               <a:rPr lang="en-US" smtClean="0"/>
-              <a:t>12/12/2020</a:t>
+              <a:t>12/13/2020</a:t>
             </a:fld>
             <a:endParaRPr lang="en-US"/>
           </a:p>
@@ -3087,7 +3092,7 @@
           <a:p>
             <a:fld id="{BF027A9F-FFBE-4CF8-85F0-6715571632A0}" type="datetime1">
               <a:rPr lang="en-US" smtClean="0"/>
-              <a:t>12/12/2020</a:t>
+              <a:t>12/13/2020</a:t>
             </a:fld>
             <a:endParaRPr lang="en-US"/>
           </a:p>
@@ -3358,7 +3363,7 @@
           <a:p>
             <a:fld id="{676414A0-764A-43D1-A10E-D337EC90DF0D}" type="datetime1">
               <a:rPr lang="en-US" smtClean="0"/>
-              <a:t>12/12/2020</a:t>
+              <a:t>12/13/2020</a:t>
             </a:fld>
             <a:endParaRPr lang="en-US"/>
           </a:p>
@@ -3765,6 +3770,14 @@
 <file path=ppt/slides/slide1.xml><?xml version="1.0" encoding="utf-8"?>
 <p:sld xmlns:a="http://schemas.openxmlformats.org/drawingml/2006/main" xmlns:r="http://schemas.openxmlformats.org/officeDocument/2006/relationships" xmlns:p="http://schemas.openxmlformats.org/presentationml/2006/main">
   <p:cSld>
+    <p:bg>
+      <p:bgPr>
+        <a:solidFill>
+          <a:schemeClr val="bg1"/>
+        </a:solidFill>
+        <a:effectLst/>
+      </p:bgPr>
+    </p:bg>
     <p:spTree>
       <p:nvGrpSpPr>
         <p:cNvPr id="1" name=""/>
@@ -3781,15 +3794,15 @@
       </p:grpSpPr>
       <p:pic>
         <p:nvPicPr>
-          <p:cNvPr id="5" name="Picture 4" descr="A picture containing grass, outdoor, sky, nature&#10;&#10;Description automatically generated">
-            <a:extLst>
-              <a:ext uri="{FF2B5EF4-FFF2-40B4-BE49-F238E27FC236}">
-                <a16:creationId xmlns:a16="http://schemas.microsoft.com/office/drawing/2014/main" id="{B435747E-1826-4E4E-BD36-0E5C719B0140}"/>
+          <p:cNvPr id="1026" name="Picture 2" descr="The Twenty Best Instagram Photographers in Denver, Colorado, in 2017 |  Westword">
+            <a:extLst>
+              <a:ext uri="{FF2B5EF4-FFF2-40B4-BE49-F238E27FC236}">
+                <a16:creationId xmlns:a16="http://schemas.microsoft.com/office/drawing/2014/main" id="{B55FBA72-E310-4F1C-BA49-B5B797BD0298}"/>
               </a:ext>
             </a:extLst>
           </p:cNvPr>
           <p:cNvPicPr>
-            <a:picLocks noChangeAspect="1"/>
+            <a:picLocks noChangeAspect="1" noChangeArrowheads="1"/>
           </p:cNvPicPr>
           <p:nvPr/>
         </p:nvPicPr>
@@ -3801,25 +3814,35 @@
               </a:ext>
             </a:extLst>
           </a:blip>
-          <a:srcRect l="30781" r="1677"/>
+          <a:srcRect l="15626" r="5782" b="-1"/>
           <a:stretch/>
         </p:blipFill>
-        <p:spPr>
+        <p:spPr bwMode="auto">
           <a:xfrm>
-            <a:off x="20" y="10"/>
-            <a:ext cx="6176054" cy="6857990"/>
+            <a:off x="4117521" y="10"/>
+            <a:ext cx="8074479" cy="6857990"/>
           </a:xfrm>
           <a:prstGeom prst="rect">
             <a:avLst/>
           </a:prstGeom>
+          <a:noFill/>
+          <a:extLst>
+            <a:ext uri="{909E8E84-426E-40DD-AFC4-6F175D3DCCD1}">
+              <a14:hiddenFill xmlns:a14="http://schemas.microsoft.com/office/drawing/2010/main">
+                <a:solidFill>
+                  <a:srgbClr val="FFFFFF"/>
+                </a:solidFill>
+              </a14:hiddenFill>
+            </a:ext>
+          </a:extLst>
         </p:spPr>
       </p:pic>
       <p:sp>
         <p:nvSpPr>
-          <p:cNvPr id="10" name="Freeform: Shape 9">
-            <a:extLst>
-              <a:ext uri="{FF2B5EF4-FFF2-40B4-BE49-F238E27FC236}">
-                <a16:creationId xmlns:a16="http://schemas.microsoft.com/office/drawing/2014/main" id="{33CBE267-1877-479F-82F0-E4BAA5BCE76F}"/>
+          <p:cNvPr id="137" name="Freeform: Shape 136">
+            <a:extLst>
+              <a:ext uri="{FF2B5EF4-FFF2-40B4-BE49-F238E27FC236}">
+                <a16:creationId xmlns:a16="http://schemas.microsoft.com/office/drawing/2014/main" id="{8F23F8A3-8FD7-4779-8323-FDC26BE99889}"/>
               </a:ext>
               <a:ext uri="{C183D7F6-B498-43B3-948B-1728B52AA6E4}">
                 <adec:decorative xmlns:adec="http://schemas.microsoft.com/office/drawing/2017/decorative" val="1"/>
@@ -3838,37 +3861,29 @@
           </p:nvPr>
         </p:nvSpPr>
         <p:spPr>
-          <a:xfrm flipH="1" flipV="1">
-            <a:off x="2454423" y="0"/>
-            <a:ext cx="9737577" cy="6858478"/>
+          <a:xfrm flipV="1">
+            <a:off x="0" y="-478"/>
+            <a:ext cx="7859800" cy="6858478"/>
           </a:xfrm>
           <a:custGeom>
             <a:avLst/>
             <a:gdLst>
-              <a:gd name="connsiteX0" fmla="*/ 0 w 9737577"/>
-              <a:gd name="connsiteY0" fmla="*/ 0 h 6858478"/>
-              <a:gd name="connsiteX1" fmla="*/ 268876 w 9737577"/>
-              <a:gd name="connsiteY1" fmla="*/ 0 h 6858478"/>
-              <a:gd name="connsiteX2" fmla="*/ 1554480 w 9737577"/>
-              <a:gd name="connsiteY2" fmla="*/ 0 h 6858478"/>
-              <a:gd name="connsiteX3" fmla="*/ 5489397 w 9737577"/>
-              <a:gd name="connsiteY3" fmla="*/ 0 h 6858478"/>
-              <a:gd name="connsiteX4" fmla="*/ 6555625 w 9737577"/>
+              <a:gd name="connsiteX0" fmla="*/ 7859800 w 7859800"/>
+              <a:gd name="connsiteY0" fmla="*/ 6858478 h 6858478"/>
+              <a:gd name="connsiteX1" fmla="*/ 435245 w 7859800"/>
+              <a:gd name="connsiteY1" fmla="*/ 6858478 h 6858478"/>
+              <a:gd name="connsiteX2" fmla="*/ 435505 w 7859800"/>
+              <a:gd name="connsiteY2" fmla="*/ 6857916 h 6858478"/>
+              <a:gd name="connsiteX3" fmla="*/ 0 w 7859800"/>
+              <a:gd name="connsiteY3" fmla="*/ 6857916 h 6858478"/>
+              <a:gd name="connsiteX4" fmla="*/ 0 w 7859800"/>
               <a:gd name="connsiteY4" fmla="*/ 0 h 6858478"/>
-              <a:gd name="connsiteX5" fmla="*/ 6561202 w 9737577"/>
+              <a:gd name="connsiteX5" fmla="*/ 3611620 w 7859800"/>
               <a:gd name="connsiteY5" fmla="*/ 0 h 6858478"/>
-              <a:gd name="connsiteX6" fmla="*/ 9737577 w 9737577"/>
-              <a:gd name="connsiteY6" fmla="*/ 6858478 h 6858478"/>
-              <a:gd name="connsiteX7" fmla="*/ 2313022 w 9737577"/>
-              <a:gd name="connsiteY7" fmla="*/ 6858478 h 6858478"/>
-              <a:gd name="connsiteX8" fmla="*/ 2313282 w 9737577"/>
-              <a:gd name="connsiteY8" fmla="*/ 6857916 h 6858478"/>
-              <a:gd name="connsiteX9" fmla="*/ 1554480 w 9737577"/>
-              <a:gd name="connsiteY9" fmla="*/ 6857916 h 6858478"/>
-              <a:gd name="connsiteX10" fmla="*/ 1554480 w 9737577"/>
-              <a:gd name="connsiteY10" fmla="*/ 6858000 h 6858478"/>
-              <a:gd name="connsiteX11" fmla="*/ 0 w 9737577"/>
-              <a:gd name="connsiteY11" fmla="*/ 6858000 h 6858478"/>
+              <a:gd name="connsiteX6" fmla="*/ 4677848 w 7859800"/>
+              <a:gd name="connsiteY6" fmla="*/ 0 h 6858478"/>
+              <a:gd name="connsiteX7" fmla="*/ 4683425 w 7859800"/>
+              <a:gd name="connsiteY7" fmla="*/ 0 h 6858478"/>
             </a:gdLst>
             <a:ahLst/>
             <a:cxnLst>
@@ -3896,57 +3911,33 @@
               <a:cxn ang="0">
                 <a:pos x="connsiteX7" y="connsiteY7"/>
               </a:cxn>
-              <a:cxn ang="0">
-                <a:pos x="connsiteX8" y="connsiteY8"/>
-              </a:cxn>
-              <a:cxn ang="0">
-                <a:pos x="connsiteX9" y="connsiteY9"/>
-              </a:cxn>
-              <a:cxn ang="0">
-                <a:pos x="connsiteX10" y="connsiteY10"/>
-              </a:cxn>
-              <a:cxn ang="0">
-                <a:pos x="connsiteX11" y="connsiteY11"/>
-              </a:cxn>
             </a:cxnLst>
             <a:rect l="l" t="t" r="r" b="b"/>
             <a:pathLst>
-              <a:path w="9737577" h="6858478">
+              <a:path w="7859800" h="6858478">
                 <a:moveTo>
-                  <a:pt x="0" y="0"/>
+                  <a:pt x="7859800" y="6858478"/>
                 </a:moveTo>
                 <a:lnTo>
-                  <a:pt x="268876" y="0"/>
+                  <a:pt x="435245" y="6858478"/>
                 </a:lnTo>
                 <a:lnTo>
-                  <a:pt x="1554480" y="0"/>
+                  <a:pt x="435505" y="6857916"/>
                 </a:lnTo>
                 <a:lnTo>
-                  <a:pt x="5489397" y="0"/>
+                  <a:pt x="0" y="6857916"/>
                 </a:lnTo>
                 <a:lnTo>
-                  <a:pt x="6555625" y="0"/>
+                  <a:pt x="0" y="0"/>
                 </a:lnTo>
                 <a:lnTo>
-                  <a:pt x="6561202" y="0"/>
+                  <a:pt x="3611620" y="0"/>
                 </a:lnTo>
                 <a:lnTo>
-                  <a:pt x="9737577" y="6858478"/>
+                  <a:pt x="4677848" y="0"/>
                 </a:lnTo>
                 <a:lnTo>
-                  <a:pt x="2313022" y="6858478"/>
-                </a:lnTo>
-                <a:lnTo>
-                  <a:pt x="2313282" y="6857916"/>
-                </a:lnTo>
-                <a:lnTo>
-                  <a:pt x="1554480" y="6857916"/>
-                </a:lnTo>
-                <a:lnTo>
-                  <a:pt x="1554480" y="6858000"/>
-                </a:lnTo>
-                <a:lnTo>
-                  <a:pt x="0" y="6858000"/>
+                  <a:pt x="4683425" y="0"/>
                 </a:lnTo>
                 <a:close/>
               </a:path>
@@ -3992,10 +3983,10 @@
       </p:sp>
       <p:sp>
         <p:nvSpPr>
-          <p:cNvPr id="12" name="Freeform: Shape 11">
-            <a:extLst>
-              <a:ext uri="{FF2B5EF4-FFF2-40B4-BE49-F238E27FC236}">
-                <a16:creationId xmlns:a16="http://schemas.microsoft.com/office/drawing/2014/main" id="{F2EA12E3-1C9E-43D7-ABCC-C16A6ED4B0AE}"/>
+          <p:cNvPr id="139" name="Freeform: Shape 138">
+            <a:extLst>
+              <a:ext uri="{FF2B5EF4-FFF2-40B4-BE49-F238E27FC236}">
+                <a16:creationId xmlns:a16="http://schemas.microsoft.com/office/drawing/2014/main" id="{F605C4CC-A25C-416F-8333-7CB7DC97D870}"/>
               </a:ext>
               <a:ext uri="{C183D7F6-B498-43B3-948B-1728B52AA6E4}">
                 <adec:decorative xmlns:adec="http://schemas.microsoft.com/office/drawing/2017/decorative" val="1"/>
@@ -4014,45 +4005,29 @@
           </p:nvPr>
         </p:nvSpPr>
         <p:spPr>
-          <a:xfrm flipH="1" flipV="1">
-            <a:off x="2883049" y="0"/>
-            <a:ext cx="9308951" cy="6858478"/>
+          <a:xfrm flipV="1">
+            <a:off x="0" y="-478"/>
+            <a:ext cx="7431174" cy="6858478"/>
           </a:xfrm>
           <a:custGeom>
             <a:avLst/>
             <a:gdLst>
-              <a:gd name="connsiteX0" fmla="*/ 0 w 9308951"/>
-              <a:gd name="connsiteY0" fmla="*/ 0 h 6858478"/>
-              <a:gd name="connsiteX1" fmla="*/ 838200 w 9308951"/>
-              <a:gd name="connsiteY1" fmla="*/ 0 h 6858478"/>
-              <a:gd name="connsiteX2" fmla="*/ 838200 w 9308951"/>
-              <a:gd name="connsiteY2" fmla="*/ 479 h 6858478"/>
-              <a:gd name="connsiteX3" fmla="*/ 1230899 w 9308951"/>
-              <a:gd name="connsiteY3" fmla="*/ 479 h 6858478"/>
-              <a:gd name="connsiteX4" fmla="*/ 1230899 w 9308951"/>
+              <a:gd name="connsiteX0" fmla="*/ 7431174 w 7431174"/>
+              <a:gd name="connsiteY0" fmla="*/ 6858478 h 6858478"/>
+              <a:gd name="connsiteX1" fmla="*/ 6619 w 7431174"/>
+              <a:gd name="connsiteY1" fmla="*/ 6858478 h 6858478"/>
+              <a:gd name="connsiteX2" fmla="*/ 6879 w 7431174"/>
+              <a:gd name="connsiteY2" fmla="*/ 6857916 h 6858478"/>
+              <a:gd name="connsiteX3" fmla="*/ 0 w 7431174"/>
+              <a:gd name="connsiteY3" fmla="*/ 6857916 h 6858478"/>
+              <a:gd name="connsiteX4" fmla="*/ 0 w 7431174"/>
               <a:gd name="connsiteY4" fmla="*/ 0 h 6858478"/>
-              <a:gd name="connsiteX5" fmla="*/ 5060771 w 9308951"/>
+              <a:gd name="connsiteX5" fmla="*/ 3182994 w 7431174"/>
               <a:gd name="connsiteY5" fmla="*/ 0 h 6858478"/>
-              <a:gd name="connsiteX6" fmla="*/ 6126999 w 9308951"/>
+              <a:gd name="connsiteX6" fmla="*/ 4249222 w 7431174"/>
               <a:gd name="connsiteY6" fmla="*/ 0 h 6858478"/>
-              <a:gd name="connsiteX7" fmla="*/ 6132576 w 9308951"/>
+              <a:gd name="connsiteX7" fmla="*/ 4254799 w 7431174"/>
               <a:gd name="connsiteY7" fmla="*/ 0 h 6858478"/>
-              <a:gd name="connsiteX8" fmla="*/ 9308951 w 9308951"/>
-              <a:gd name="connsiteY8" fmla="*/ 6858478 h 6858478"/>
-              <a:gd name="connsiteX9" fmla="*/ 1884396 w 9308951"/>
-              <a:gd name="connsiteY9" fmla="*/ 6858478 h 6858478"/>
-              <a:gd name="connsiteX10" fmla="*/ 1884656 w 9308951"/>
-              <a:gd name="connsiteY10" fmla="*/ 6857916 h 6858478"/>
-              <a:gd name="connsiteX11" fmla="*/ 1230899 w 9308951"/>
-              <a:gd name="connsiteY11" fmla="*/ 6857916 h 6858478"/>
-              <a:gd name="connsiteX12" fmla="*/ 1230899 w 9308951"/>
-              <a:gd name="connsiteY12" fmla="*/ 6858478 h 6858478"/>
-              <a:gd name="connsiteX13" fmla="*/ 651890 w 9308951"/>
-              <a:gd name="connsiteY13" fmla="*/ 6858478 h 6858478"/>
-              <a:gd name="connsiteX14" fmla="*/ 651890 w 9308951"/>
-              <a:gd name="connsiteY14" fmla="*/ 6858000 h 6858478"/>
-              <a:gd name="connsiteX15" fmla="*/ 0 w 9308951"/>
-              <a:gd name="connsiteY15" fmla="*/ 6858000 h 6858478"/>
             </a:gdLst>
             <a:ahLst/>
             <a:cxnLst>
@@ -4080,81 +4055,33 @@
               <a:cxn ang="0">
                 <a:pos x="connsiteX7" y="connsiteY7"/>
               </a:cxn>
-              <a:cxn ang="0">
-                <a:pos x="connsiteX8" y="connsiteY8"/>
-              </a:cxn>
-              <a:cxn ang="0">
-                <a:pos x="connsiteX9" y="connsiteY9"/>
-              </a:cxn>
-              <a:cxn ang="0">
-                <a:pos x="connsiteX10" y="connsiteY10"/>
-              </a:cxn>
-              <a:cxn ang="0">
-                <a:pos x="connsiteX11" y="connsiteY11"/>
-              </a:cxn>
-              <a:cxn ang="0">
-                <a:pos x="connsiteX12" y="connsiteY12"/>
-              </a:cxn>
-              <a:cxn ang="0">
-                <a:pos x="connsiteX13" y="connsiteY13"/>
-              </a:cxn>
-              <a:cxn ang="0">
-                <a:pos x="connsiteX14" y="connsiteY14"/>
-              </a:cxn>
-              <a:cxn ang="0">
-                <a:pos x="connsiteX15" y="connsiteY15"/>
-              </a:cxn>
             </a:cxnLst>
             <a:rect l="l" t="t" r="r" b="b"/>
             <a:pathLst>
-              <a:path w="9308951" h="6858478">
+              <a:path w="7431174" h="6858478">
                 <a:moveTo>
-                  <a:pt x="0" y="0"/>
+                  <a:pt x="7431174" y="6858478"/>
                 </a:moveTo>
                 <a:lnTo>
-                  <a:pt x="838200" y="0"/>
+                  <a:pt x="6619" y="6858478"/>
                 </a:lnTo>
                 <a:lnTo>
-                  <a:pt x="838200" y="479"/>
+                  <a:pt x="6879" y="6857916"/>
                 </a:lnTo>
                 <a:lnTo>
-                  <a:pt x="1230899" y="479"/>
+                  <a:pt x="0" y="6857916"/>
                 </a:lnTo>
                 <a:lnTo>
-                  <a:pt x="1230899" y="0"/>
+                  <a:pt x="0" y="0"/>
                 </a:lnTo>
                 <a:lnTo>
-                  <a:pt x="5060771" y="0"/>
+                  <a:pt x="3182994" y="0"/>
                 </a:lnTo>
                 <a:lnTo>
-                  <a:pt x="6126999" y="0"/>
+                  <a:pt x="4249222" y="0"/>
                 </a:lnTo>
                 <a:lnTo>
-                  <a:pt x="6132576" y="0"/>
-                </a:lnTo>
-                <a:lnTo>
-                  <a:pt x="9308951" y="6858478"/>
-                </a:lnTo>
-                <a:lnTo>
-                  <a:pt x="1884396" y="6858478"/>
-                </a:lnTo>
-                <a:lnTo>
-                  <a:pt x="1884656" y="6857916"/>
-                </a:lnTo>
-                <a:lnTo>
-                  <a:pt x="1230899" y="6857916"/>
-                </a:lnTo>
-                <a:lnTo>
-                  <a:pt x="1230899" y="6858478"/>
-                </a:lnTo>
-                <a:lnTo>
-                  <a:pt x="651890" y="6858478"/>
-                </a:lnTo>
-                <a:lnTo>
-                  <a:pt x="651890" y="6858000"/>
-                </a:lnTo>
-                <a:lnTo>
-                  <a:pt x="0" y="6858000"/>
+                  <a:pt x="4254799" y="0"/>
                 </a:lnTo>
                 <a:close/>
               </a:path>
@@ -4215,8 +4142,8 @@
         </p:nvSpPr>
         <p:spPr>
           <a:xfrm>
-            <a:off x="5910943" y="365125"/>
-            <a:ext cx="5442856" cy="1325563"/>
+            <a:off x="804672" y="365125"/>
+            <a:ext cx="5266155" cy="1325563"/>
           </a:xfrm>
         </p:spPr>
         <p:txBody>
@@ -4227,7 +4154,7 @@
           <a:p>
             <a:pPr algn="l"/>
             <a:r>
-              <a:rPr lang="en-US" sz="4400" dirty="0"/>
+              <a:rPr lang="en-US" sz="4400"/>
               <a:t>Criminal Weather</a:t>
             </a:r>
           </a:p>
@@ -4251,8 +4178,8 @@
         </p:nvSpPr>
         <p:spPr>
           <a:xfrm>
-            <a:off x="6343650" y="2055803"/>
-            <a:ext cx="4486275" cy="4154361"/>
+            <a:off x="804672" y="2022601"/>
+            <a:ext cx="3941499" cy="4154361"/>
           </a:xfrm>
         </p:spPr>
         <p:txBody>
@@ -4266,11 +4193,11 @@
               <a:buChar char="•"/>
             </a:pPr>
             <a:r>
-              <a:rPr lang="en-US" sz="2000" b="1" dirty="0"/>
+              <a:rPr lang="en-US" sz="2000" b="1"/>
               <a:t>Melanie Nolker</a:t>
             </a:r>
             <a:r>
-              <a:rPr lang="en-US" sz="2000" dirty="0"/>
+              <a:rPr lang="en-US" sz="2000"/>
               <a:t> </a:t>
             </a:r>
           </a:p>
@@ -4280,11 +4207,11 @@
               <a:buChar char="•"/>
             </a:pPr>
             <a:r>
-              <a:rPr lang="en-US" sz="2000" b="1" dirty="0"/>
+              <a:rPr lang="en-US" sz="2000" b="1"/>
               <a:t>Lisa Stroh</a:t>
             </a:r>
             <a:r>
-              <a:rPr lang="en-US" sz="2000" dirty="0"/>
+              <a:rPr lang="en-US" sz="2000"/>
               <a:t> </a:t>
             </a:r>
           </a:p>
@@ -4294,11 +4221,11 @@
               <a:buChar char="•"/>
             </a:pPr>
             <a:r>
-              <a:rPr lang="en-US" sz="2000" b="1" dirty="0"/>
+              <a:rPr lang="en-US" sz="2000" b="1"/>
               <a:t>Kathy Nguyen</a:t>
             </a:r>
             <a:r>
-              <a:rPr lang="en-US" sz="2000" dirty="0"/>
+              <a:rPr lang="en-US" sz="2000"/>
               <a:t> </a:t>
             </a:r>
           </a:p>
@@ -4308,15 +4235,11 @@
               <a:buChar char="•"/>
             </a:pPr>
             <a:r>
-              <a:rPr lang="en-US" sz="2000" b="1" dirty="0"/>
-              <a:t>April </a:t>
-            </a:r>
-            <a:r>
-              <a:rPr lang="en-US" sz="2000" b="1" dirty="0" err="1"/>
-              <a:t>Lagnevall</a:t>
-            </a:r>
-            <a:r>
-              <a:rPr lang="en-US" sz="2000" dirty="0"/>
+              <a:rPr lang="en-US" sz="2000" b="1"/>
+              <a:t>April Lagnevall</a:t>
+            </a:r>
+            <a:r>
+              <a:rPr lang="en-US" sz="2000"/>
               <a:t> </a:t>
             </a:r>
           </a:p>
@@ -4326,14 +4249,10 @@
               <a:buChar char="•"/>
             </a:pPr>
             <a:r>
-              <a:rPr lang="en-US" sz="2000" b="1" dirty="0"/>
-              <a:t>Haifa </a:t>
-            </a:r>
-            <a:r>
-              <a:rPr lang="en-US" sz="2000" b="1" dirty="0" err="1"/>
-              <a:t>Najdawi</a:t>
-            </a:r>
-            <a:endParaRPr lang="en-US" sz="2000" dirty="0"/>
+              <a:rPr lang="en-US" sz="2000" b="1"/>
+              <a:t>Haifa Najdawi</a:t>
+            </a:r>
+            <a:endParaRPr lang="en-US" sz="2000"/>
           </a:p>
         </p:txBody>
       </p:sp>
@@ -4351,8 +4270,8 @@
         </p:nvSpPr>
         <p:spPr>
           <a:xfrm>
-            <a:off x="6012120" y="1352994"/>
-            <a:ext cx="3897670" cy="369332"/>
+            <a:off x="804672" y="1341563"/>
+            <a:ext cx="4913974" cy="369332"/>
           </a:xfrm>
           <a:prstGeom prst="rect">
             <a:avLst/>
@@ -4364,13 +4283,18 @@
           </a:bodyPr>
           <a:lstStyle/>
           <a:p>
+            <a:pPr>
+              <a:spcAft>
+                <a:spcPts val="600"/>
+              </a:spcAft>
+            </a:pPr>
             <a:r>
               <a:rPr lang="en-US" b="1" dirty="0">
                 <a:solidFill>
                   <a:schemeClr val="accent1"/>
                 </a:solidFill>
               </a:rPr>
-              <a:t>Analysis of Crime &amp; Weather in Denver</a:t>
+              <a:t>Analysis of Crime &amp; Weather in the city of Denver</a:t>
             </a:r>
           </a:p>
         </p:txBody>
@@ -4450,28 +4374,40 @@
             <p:ph idx="1"/>
           </p:nvPr>
         </p:nvSpPr>
-        <p:spPr/>
-        <p:txBody>
-          <a:bodyPr/>
-          <a:lstStyle/>
-          <a:p>
-            <a:r>
-              <a:rPr lang="en-US"/>
-              <a:t>Define the core message or hypothesis of your project.</a:t>
-            </a:r>
-          </a:p>
-          <a:p>
-            <a:r>
-              <a:rPr lang="en-US"/>
-              <a:t>Describe the questions you asked, and why you asked them</a:t>
-            </a:r>
-          </a:p>
-          <a:p>
-            <a:r>
-              <a:rPr lang="en-US"/>
-              <a:t>Describe whether you were able to answer these questions to your satisfaction, and briefly summarize your findings</a:t>
-            </a:r>
-            <a:endParaRPr lang="en-US" dirty="0"/>
+        <p:spPr>
+          <a:xfrm>
+            <a:off x="838199" y="1825625"/>
+            <a:ext cx="10925175" cy="4351338"/>
+          </a:xfrm>
+        </p:spPr>
+        <p:txBody>
+          <a:bodyPr/>
+          <a:lstStyle/>
+          <a:p>
+            <a:r>
+              <a:rPr lang="en-US" dirty="0"/>
+              <a:t>Does weather have an impact on a crime? </a:t>
+            </a:r>
+          </a:p>
+          <a:p>
+            <a:r>
+              <a:rPr lang="en-US" dirty="0"/>
+              <a:t>Find if there is a correlation in non-traffic crime in the city of Denver compared to various weather conditions.</a:t>
+            </a:r>
+          </a:p>
+          <a:p>
+            <a:pPr lvl="1"/>
+            <a:r>
+              <a:rPr lang="en-US" sz="2800" dirty="0"/>
+              <a:t>Hypothesis: Weather has an impact on non-traffic crime in Denver.</a:t>
+            </a:r>
+          </a:p>
+          <a:p>
+            <a:pPr lvl="1"/>
+            <a:r>
+              <a:rPr lang="en-US" sz="2800" dirty="0"/>
+              <a:t>Null Hypothesis: Weather does not affect non-traffic crime in Denver.</a:t>
+            </a:r>
           </a:p>
         </p:txBody>
       </p:sp>
@@ -4498,7 +4434,7 @@
           <a:p>
             <a:fld id="{96C9FCF8-8637-4D06-AB7A-ED9374722F1A}" type="datetime1">
               <a:rPr lang="en-US" smtClean="0"/>
-              <a:t>12/12/2020</a:t>
+              <a:t>12/13/2020</a:t>
             </a:fld>
             <a:endParaRPr lang="en-US"/>
           </a:p>
@@ -4635,14 +4571,123 @@
             <p:ph idx="1"/>
           </p:nvPr>
         </p:nvSpPr>
-        <p:spPr/>
-        <p:txBody>
-          <a:bodyPr/>
+        <p:spPr>
+          <a:xfrm>
+            <a:off x="838200" y="1690688"/>
+            <a:ext cx="10515600" cy="4351338"/>
+          </a:xfrm>
+        </p:spPr>
+        <p:txBody>
+          <a:bodyPr>
+            <a:normAutofit fontScale="92500" lnSpcReduction="20000"/>
+          </a:bodyPr>
           <a:lstStyle/>
           <a:p>
             <a:r>
               <a:rPr lang="en-US" dirty="0"/>
-              <a:t>Elaborate on the questions you asked, describing what kinds of data you needed to answer them, and where you found it</a:t>
+              <a:t>Is there a correlation between crime &amp; weather?</a:t>
+            </a:r>
+          </a:p>
+          <a:p>
+            <a:pPr lvl="1"/>
+            <a:r>
+              <a:rPr lang="en-US" dirty="0"/>
+              <a:t>What type of offenses will be used to analyze crime rates?</a:t>
+            </a:r>
+          </a:p>
+          <a:p>
+            <a:pPr lvl="1"/>
+            <a:r>
+              <a:rPr lang="en-US" dirty="0"/>
+              <a:t>What weather conditions will be used to compare to offenses?</a:t>
+            </a:r>
+          </a:p>
+          <a:p>
+            <a:endParaRPr lang="en-US" dirty="0"/>
+          </a:p>
+          <a:p>
+            <a:r>
+              <a:rPr lang="en-US" dirty="0"/>
+              <a:t>Datasets Used:</a:t>
+            </a:r>
+          </a:p>
+          <a:p>
+            <a:pPr lvl="1"/>
+            <a:r>
+              <a:rPr lang="en-US" dirty="0"/>
+              <a:t>Crime data: </a:t>
+            </a:r>
+            <a:r>
+              <a:rPr lang="en-US" dirty="0">
+                <a:solidFill>
+                  <a:schemeClr val="tx2">
+                    <a:lumMod val="50000"/>
+                  </a:schemeClr>
+                </a:solidFill>
+                <a:hlinkClick r:id="rId2">
+                  <a:extLst>
+                    <a:ext uri="{A12FA001-AC4F-418D-AE19-62706E023703}">
+                      <ahyp:hlinkClr xmlns:ahyp="http://schemas.microsoft.com/office/drawing/2018/hyperlinkcolor" val="tx"/>
+                    </a:ext>
+                  </a:extLst>
+                </a:hlinkClick>
+              </a:rPr>
+              <a:t>https://www.denvergov.org/opendata/dataset/city-and-county-of-denver-crime</a:t>
+            </a:r>
+            <a:r>
+              <a:rPr lang="en-US" dirty="0">
+                <a:solidFill>
+                  <a:schemeClr val="tx2">
+                    <a:lumMod val="50000"/>
+                  </a:schemeClr>
+                </a:solidFill>
+              </a:rPr>
+              <a:t> </a:t>
+            </a:r>
+          </a:p>
+          <a:p>
+            <a:pPr lvl="2"/>
+            <a:r>
+              <a:rPr lang="en-US" dirty="0"/>
+              <a:t>Denver city crime from 1-1-2016 to 9-9-20</a:t>
+            </a:r>
+          </a:p>
+          <a:p>
+            <a:r>
+              <a:rPr lang="en-US" dirty="0"/>
+              <a:t>Weather data: </a:t>
+            </a:r>
+            <a:r>
+              <a:rPr lang="en-US" dirty="0">
+                <a:solidFill>
+                  <a:schemeClr val="tx2">
+                    <a:lumMod val="50000"/>
+                  </a:schemeClr>
+                </a:solidFill>
+                <a:hlinkClick r:id="rId3">
+                  <a:extLst>
+                    <a:ext uri="{A12FA001-AC4F-418D-AE19-62706E023703}">
+                      <ahyp:hlinkClr xmlns:ahyp="http://schemas.microsoft.com/office/drawing/2018/hyperlinkcolor" val="tx"/>
+                    </a:ext>
+                  </a:extLst>
+                </a:hlinkClick>
+              </a:rPr>
+              <a:t>https://www.worldweatheronline.com/developer/api/docs/historical-weather-api.aspx#qparameter</a:t>
+            </a:r>
+            <a:endParaRPr lang="en-US" dirty="0"/>
+          </a:p>
+          <a:p>
+            <a:pPr lvl="1"/>
+            <a:r>
+              <a:rPr lang="en-US" dirty="0"/>
+              <a:t>Weather API = API and pulls weather data for every day from 1/1/2016 to 8/31/2020</a:t>
+            </a:r>
+          </a:p>
+          <a:p>
+            <a:pPr lvl="1"/>
+            <a:r>
+              <a:rPr lang="en-US" dirty="0"/>
+              <a:t>pull multiple weather conditions</a:t>
             </a:r>
           </a:p>
         </p:txBody>
@@ -4670,7 +4715,7 @@
           <a:p>
             <a:fld id="{0BBF24F5-615C-4D77-80D1-2C6A0C08A0B3}" type="datetime1">
               <a:rPr lang="en-US" smtClean="0"/>
-              <a:t>12/12/2020</a:t>
+              <a:t>12/15/2020</a:t>
             </a:fld>
             <a:endParaRPr lang="en-US"/>
           </a:p>
@@ -4809,38 +4854,74 @@
         </p:nvSpPr>
         <p:spPr/>
         <p:txBody>
-          <a:bodyPr/>
+          <a:bodyPr>
+            <a:normAutofit/>
+          </a:bodyPr>
           <a:lstStyle/>
           <a:p>
             <a:r>
               <a:rPr lang="en-US" dirty="0"/>
-              <a:t>Describe the exploration and cleanup process</a:t>
-            </a:r>
-          </a:p>
-          <a:p>
+              <a:t>Violent Crime: </a:t>
+            </a:r>
+          </a:p>
+          <a:p>
+            <a:pPr lvl="1"/>
             <a:r>
               <a:rPr lang="en-US" dirty="0"/>
-              <a:t>Discuss insights you had while exploring the data that you didn't anticipate</a:t>
-            </a:r>
-          </a:p>
-          <a:p>
+              <a:t>filter for "Is Crime" = 1</a:t>
+            </a:r>
+          </a:p>
+          <a:p>
+            <a:pPr lvl="1"/>
             <a:r>
               <a:rPr lang="en-US" dirty="0"/>
-              <a:t>Discuss any problems that arose after exploring the data, and how you resolved them</a:t>
-            </a:r>
-          </a:p>
-          <a:p>
+              <a:t>Excluded traffic related offenses</a:t>
+            </a:r>
+          </a:p>
+          <a:p>
+            <a:pPr lvl="1"/>
             <a:r>
               <a:rPr lang="en-US" dirty="0"/>
-              <a:t>Present and discuss interesting figures developed during exploration, ideally with the help of </a:t>
+              <a:t>Grouped .csv data by: </a:t>
             </a:r>
             <a:r>
               <a:rPr lang="en-US" dirty="0" err="1"/>
-              <a:t>Jupyter</a:t>
+              <a:t>Occurrence_date</a:t>
             </a:r>
             <a:r>
               <a:rPr lang="en-US" dirty="0"/>
-              <a:t> Notebook</a:t>
+              <a:t> &amp; OFFENSE_TYPE_ID</a:t>
+            </a:r>
+          </a:p>
+          <a:p>
+            <a:pPr lvl="1"/>
+            <a:endParaRPr lang="en-US" dirty="0"/>
+          </a:p>
+          <a:p>
+            <a:r>
+              <a:rPr lang="en-US" dirty="0"/>
+              <a:t>Denver Weather:</a:t>
+            </a:r>
+          </a:p>
+          <a:p>
+            <a:pPr lvl="1"/>
+            <a:r>
+              <a:rPr lang="en-US" dirty="0"/>
+              <a:t>avg temperature (F)&gt;&gt;&gt;- </a:t>
+            </a:r>
+          </a:p>
+          <a:p>
+            <a:pPr lvl="1"/>
+            <a:r>
+              <a:rPr lang="en-US" dirty="0"/>
+              <a:t>Averaged daily rate</a:t>
+            </a:r>
+          </a:p>
+          <a:p>
+            <a:pPr lvl="1"/>
+            <a:r>
+              <a:rPr lang="en-US" dirty="0"/>
+              <a:t>avg precipitation (inches)&gt;&gt;&gt;- avg cloud cover (%)&gt;&gt;&gt;- avg wind speed (mph)</a:t>
             </a:r>
           </a:p>
         </p:txBody>
@@ -4868,7 +4949,7 @@
           <a:p>
             <a:fld id="{85EF9331-8EAB-4813-BC0B-33DA0484FF78}" type="datetime1">
               <a:rPr lang="en-US" smtClean="0"/>
-              <a:t>12/12/2020</a:t>
+              <a:t>12/15/2020</a:t>
             </a:fld>
             <a:endParaRPr lang="en-US"/>
           </a:p>
@@ -5012,20 +5093,47 @@
           <a:p>
             <a:r>
               <a:rPr lang="en-US" dirty="0"/>
+              <a:t>&lt;answer&gt;</a:t>
+            </a:r>
+            <a:endParaRPr lang="en-US" dirty="0">
+              <a:solidFill>
+                <a:srgbClr val="FF0000"/>
+              </a:solidFill>
+            </a:endParaRPr>
+          </a:p>
+          <a:p>
+            <a:r>
+              <a:rPr lang="en-US" dirty="0">
+                <a:solidFill>
+                  <a:srgbClr val="FFC000"/>
+                </a:solidFill>
+              </a:rPr>
               <a:t>Discuss the steps you took to analyze the data and answer each question you asked in your proposal</a:t>
             </a:r>
           </a:p>
           <a:p>
             <a:r>
-              <a:rPr lang="en-US" dirty="0"/>
+              <a:rPr lang="en-US" dirty="0">
+                <a:solidFill>
+                  <a:srgbClr val="FFC000"/>
+                </a:solidFill>
+              </a:rPr>
               <a:t>Present and discuss interesting figures developed during analysis, ideally with the help of </a:t>
             </a:r>
             <a:r>
-              <a:rPr lang="en-US" dirty="0" err="1"/>
+              <a:rPr lang="en-US" dirty="0" err="1">
+                <a:solidFill>
+                  <a:srgbClr val="FFC000"/>
+                </a:solidFill>
+              </a:rPr>
               <a:t>Jupyter</a:t>
             </a:r>
             <a:r>
-              <a:rPr lang="en-US" dirty="0"/>
+              <a:rPr lang="en-US" dirty="0">
+                <a:solidFill>
+                  <a:srgbClr val="FFC000"/>
+                </a:solidFill>
+              </a:rPr>
               <a:t> Notebook</a:t>
             </a:r>
           </a:p>
@@ -5054,7 +5162,7 @@
           <a:p>
             <a:fld id="{65DC0E7A-145B-4305-A340-5D82B337A99D}" type="datetime1">
               <a:rPr lang="en-US" smtClean="0"/>
-              <a:t>12/12/2020</a:t>
+              <a:t>12/13/2020</a:t>
             </a:fld>
             <a:endParaRPr lang="en-US"/>
           </a:p>
@@ -5198,6 +5306,21 @@
           <a:p>
             <a:r>
               <a:rPr lang="en-US" dirty="0"/>
+              <a:t>&lt;answer&gt;</a:t>
+            </a:r>
+            <a:endParaRPr lang="en-US" dirty="0">
+              <a:solidFill>
+                <a:srgbClr val="FF0000"/>
+              </a:solidFill>
+            </a:endParaRPr>
+          </a:p>
+          <a:p>
+            <a:r>
+              <a:rPr lang="en-US" dirty="0">
+                <a:solidFill>
+                  <a:srgbClr val="FFC000"/>
+                </a:solidFill>
+              </a:rPr>
               <a:t>Discuss your findings. Did you find what you expected to find? If not, why not? What inferences or general conclusions can you draw from your analysis?</a:t>
             </a:r>
           </a:p>
@@ -5226,7 +5349,7 @@
           <a:p>
             <a:fld id="{5861531B-59A1-48FF-BD14-C7973E81237A}" type="datetime1">
               <a:rPr lang="en-US" smtClean="0"/>
-              <a:t>12/12/2020</a:t>
+              <a:t>12/13/2020</a:t>
             </a:fld>
             <a:endParaRPr lang="en-US"/>
           </a:p>
@@ -5370,12 +5493,26 @@
           <a:p>
             <a:r>
               <a:rPr lang="en-US" dirty="0"/>
+              <a:t>&lt;answer&gt;</a:t>
+            </a:r>
+          </a:p>
+          <a:p>
+            <a:r>
+              <a:rPr lang="en-US" dirty="0">
+                <a:solidFill>
+                  <a:srgbClr val="FFC000"/>
+                </a:solidFill>
+              </a:rPr>
               <a:t>Discuss any difficulties that arose, and how you dealt with them</a:t>
             </a:r>
           </a:p>
           <a:p>
             <a:r>
-              <a:rPr lang="en-US" dirty="0"/>
+              <a:rPr lang="en-US" dirty="0">
+                <a:solidFill>
+                  <a:srgbClr val="FFC000"/>
+                </a:solidFill>
+              </a:rPr>
               <a:t>Discuss any additional questions that came up, but which you didn't have time to answer: What would you research next, if you had two more weeks?</a:t>
             </a:r>
           </a:p>
@@ -5404,7 +5541,7 @@
           <a:p>
             <a:fld id="{AC44310D-2C1F-43AD-A576-163C88566A1C}" type="datetime1">
               <a:rPr lang="en-US" smtClean="0"/>
-              <a:t>12/12/2020</a:t>
+              <a:t>12/13/2020</a:t>
             </a:fld>
             <a:endParaRPr lang="en-US"/>
           </a:p>
@@ -5659,7 +5796,7 @@
           <a:p>
             <a:fld id="{1679CB42-FD62-451D-9C87-B3F507A14816}" type="datetime1">
               <a:rPr lang="en-US" smtClean="0"/>
-              <a:t>12/12/2020</a:t>
+              <a:t>12/13/2020</a:t>
             </a:fld>
             <a:endParaRPr lang="en-US"/>
           </a:p>

</xml_diff>